<commit_message>
Reverting new london back to a single berth throughout pipeline, archiving previous results, adding results for 80pct overlap runs
</commit_message>
<xml_diff>
--- a/analysis/results/optimal_scenarios/post_proc.pptx
+++ b/analysis/results/optimal_scenarios/post_proc.pptx
@@ -2609,7 +2609,7 @@
         <p:spPr>
           <a:xfrm>
             <a:off x="0" y="566928"/>
-            <a:ext cx="3886200" cy="4929862"/>
+            <a:ext cx="3886200" cy="4932081"/>
           </a:xfrm>
           <a:prstGeom prst="rect">
             <a:avLst/>
@@ -2672,7 +2672,7 @@
         <p:spPr>
           <a:xfrm>
             <a:off x="0" y="566928"/>
-            <a:ext cx="12188952" cy="8228396"/>
+            <a:ext cx="12188952" cy="8247478"/>
           </a:xfrm>
           <a:prstGeom prst="rect">
             <a:avLst/>
@@ -2798,7 +2798,7 @@
         <p:spPr>
           <a:xfrm>
             <a:off x="0" y="566928"/>
-            <a:ext cx="12188952" cy="5338489"/>
+            <a:ext cx="12188952" cy="5345654"/>
           </a:xfrm>
           <a:prstGeom prst="rect">
             <a:avLst/>
@@ -2861,7 +2861,7 @@
         <p:spPr>
           <a:xfrm>
             <a:off x="0" y="566928"/>
-            <a:ext cx="3886200" cy="4929862"/>
+            <a:ext cx="3886200" cy="4932081"/>
           </a:xfrm>
           <a:prstGeom prst="rect">
             <a:avLst/>
@@ -2924,7 +2924,7 @@
         <p:spPr>
           <a:xfrm>
             <a:off x="0" y="566928"/>
-            <a:ext cx="12188952" cy="8228396"/>
+            <a:ext cx="12188952" cy="8247478"/>
           </a:xfrm>
           <a:prstGeom prst="rect">
             <a:avLst/>
@@ -3050,7 +3050,7 @@
         <p:spPr>
           <a:xfrm>
             <a:off x="0" y="566928"/>
-            <a:ext cx="12188952" cy="5338489"/>
+            <a:ext cx="12188952" cy="5345654"/>
           </a:xfrm>
           <a:prstGeom prst="rect">
             <a:avLst/>
@@ -3113,7 +3113,7 @@
         <p:spPr>
           <a:xfrm>
             <a:off x="0" y="566928"/>
-            <a:ext cx="12188952" cy="4984778"/>
+            <a:ext cx="12188952" cy="5037527"/>
           </a:xfrm>
           <a:prstGeom prst="rect">
             <a:avLst/>
@@ -3176,7 +3176,7 @@
         <p:spPr>
           <a:xfrm>
             <a:off x="0" y="566928"/>
-            <a:ext cx="12188952" cy="5091404"/>
+            <a:ext cx="12188952" cy="4984778"/>
           </a:xfrm>
           <a:prstGeom prst="rect">
             <a:avLst/>
@@ -3239,7 +3239,7 @@
         <p:spPr>
           <a:xfrm>
             <a:off x="0" y="566928"/>
-            <a:ext cx="12188952" cy="8228396"/>
+            <a:ext cx="12188952" cy="8247478"/>
           </a:xfrm>
           <a:prstGeom prst="rect">
             <a:avLst/>
@@ -3365,7 +3365,7 @@
         <p:spPr>
           <a:xfrm>
             <a:off x="0" y="566928"/>
-            <a:ext cx="12188952" cy="5338489"/>
+            <a:ext cx="12188952" cy="5345654"/>
           </a:xfrm>
           <a:prstGeom prst="rect">
             <a:avLst/>
@@ -3428,7 +3428,7 @@
         <p:spPr>
           <a:xfrm>
             <a:off x="0" y="566928"/>
-            <a:ext cx="3886200" cy="4929862"/>
+            <a:ext cx="3886200" cy="4918799"/>
           </a:xfrm>
           <a:prstGeom prst="rect">
             <a:avLst/>
@@ -3491,7 +3491,7 @@
         <p:spPr>
           <a:xfrm>
             <a:off x="0" y="566928"/>
-            <a:ext cx="12188952" cy="8228396"/>
+            <a:ext cx="12188952" cy="8247478"/>
           </a:xfrm>
           <a:prstGeom prst="rect">
             <a:avLst/>
@@ -3617,7 +3617,7 @@
         <p:spPr>
           <a:xfrm>
             <a:off x="0" y="566928"/>
-            <a:ext cx="12188952" cy="5388649"/>
+            <a:ext cx="12188952" cy="5345654"/>
           </a:xfrm>
           <a:prstGeom prst="rect">
             <a:avLst/>
@@ -3680,7 +3680,7 @@
         <p:spPr>
           <a:xfrm>
             <a:off x="0" y="566928"/>
-            <a:ext cx="3886200" cy="4929862"/>
+            <a:ext cx="3886200" cy="4932081"/>
           </a:xfrm>
           <a:prstGeom prst="rect">
             <a:avLst/>

</xml_diff>

<commit_message>
updating new results with csv files including turbine phase start dates
</commit_message>
<xml_diff>
--- a/analysis/results/optimal_scenarios/post_proc.pptx
+++ b/analysis/results/optimal_scenarios/post_proc.pptx
@@ -3113,7 +3113,7 @@
         <p:spPr>
           <a:xfrm>
             <a:off x="0" y="566928"/>
-            <a:ext cx="12188952" cy="5037527"/>
+            <a:ext cx="12188952" cy="4984778"/>
           </a:xfrm>
           <a:prstGeom prst="rect">
             <a:avLst/>
@@ -3680,7 +3680,7 @@
         <p:spPr>
           <a:xfrm>
             <a:off x="0" y="566928"/>
-            <a:ext cx="3886200" cy="4932081"/>
+            <a:ext cx="3886200" cy="4905588"/>
           </a:xfrm>
           <a:prstGeom prst="rect">
             <a:avLst/>

</xml_diff>